<commit_message>
Integrando modificaciones al archivo de capacitacion de empleados
</commit_message>
<xml_diff>
--- a/adicionales/presentacion procesos/Capacitación de los procesos via.pptx
+++ b/adicionales/presentacion procesos/Capacitación de los procesos via.pptx
@@ -24,6 +24,10 @@
     <p:sldId id="262" r:id="rId18"/>
     <p:sldId id="263" r:id="rId19"/>
     <p:sldId id="274" r:id="rId20"/>
+    <p:sldId id="275" r:id="rId21"/>
+    <p:sldId id="276" r:id="rId22"/>
+    <p:sldId id="277" r:id="rId23"/>
+    <p:sldId id="278" r:id="rId24"/>
   </p:sldIdLst>
   <p:sldSz cx="12192000" cy="6858000"/>
   <p:notesSz cx="6858000" cy="9144000"/>
@@ -322,7 +326,7 @@
             <a:fld id="{B61BEF0D-F0BB-DE4B-95CE-6DB70DBA9567}" type="datetimeFigureOut">
               <a:rPr lang="en-US" dirty="0"/>
               <a:pPr/>
-              <a:t>6/15/2015</a:t>
+              <a:t>6/16/2015</a:t>
             </a:fld>
             <a:endParaRPr lang="en-US" dirty="0"/>
           </a:p>
@@ -755,7 +759,7 @@
             <a:fld id="{B61BEF0D-F0BB-DE4B-95CE-6DB70DBA9567}" type="datetimeFigureOut">
               <a:rPr lang="en-US" dirty="0"/>
               <a:pPr/>
-              <a:t>6/15/2015</a:t>
+              <a:t>6/16/2015</a:t>
             </a:fld>
             <a:endParaRPr lang="en-US" dirty="0"/>
           </a:p>
@@ -1002,7 +1006,7 @@
             <a:fld id="{B61BEF0D-F0BB-DE4B-95CE-6DB70DBA9567}" type="datetimeFigureOut">
               <a:rPr lang="en-US" dirty="0"/>
               <a:pPr/>
-              <a:t>6/15/2015</a:t>
+              <a:t>6/16/2015</a:t>
             </a:fld>
             <a:endParaRPr lang="en-US" dirty="0"/>
           </a:p>
@@ -1307,7 +1311,7 @@
             <a:fld id="{B61BEF0D-F0BB-DE4B-95CE-6DB70DBA9567}" type="datetimeFigureOut">
               <a:rPr lang="en-US" dirty="0"/>
               <a:pPr/>
-              <a:t>6/15/2015</a:t>
+              <a:t>6/16/2015</a:t>
             </a:fld>
             <a:endParaRPr lang="en-US" dirty="0"/>
           </a:p>
@@ -1622,7 +1626,7 @@
             <a:fld id="{B61BEF0D-F0BB-DE4B-95CE-6DB70DBA9567}" type="datetimeFigureOut">
               <a:rPr lang="en-US" dirty="0"/>
               <a:pPr/>
-              <a:t>6/15/2015</a:t>
+              <a:t>6/16/2015</a:t>
             </a:fld>
             <a:endParaRPr lang="en-US" dirty="0"/>
           </a:p>
@@ -1921,7 +1925,7 @@
             <a:fld id="{B61BEF0D-F0BB-DE4B-95CE-6DB70DBA9567}" type="datetimeFigureOut">
               <a:rPr lang="en-US" dirty="0"/>
               <a:pPr/>
-              <a:t>6/15/2015</a:t>
+              <a:t>6/16/2015</a:t>
             </a:fld>
             <a:endParaRPr lang="en-US" dirty="0"/>
           </a:p>
@@ -2285,7 +2289,7 @@
             <a:fld id="{B61BEF0D-F0BB-DE4B-95CE-6DB70DBA9567}" type="datetimeFigureOut">
               <a:rPr lang="en-US" dirty="0"/>
               <a:pPr/>
-              <a:t>6/15/2015</a:t>
+              <a:t>6/16/2015</a:t>
             </a:fld>
             <a:endParaRPr lang="en-US" dirty="0"/>
           </a:p>
@@ -2456,7 +2460,7 @@
             <a:fld id="{B61BEF0D-F0BB-DE4B-95CE-6DB70DBA9567}" type="datetimeFigureOut">
               <a:rPr lang="en-US" dirty="0"/>
               <a:pPr/>
-              <a:t>6/15/2015</a:t>
+              <a:t>6/16/2015</a:t>
             </a:fld>
             <a:endParaRPr lang="en-US" dirty="0"/>
           </a:p>
@@ -2633,7 +2637,7 @@
             <a:fld id="{B61BEF0D-F0BB-DE4B-95CE-6DB70DBA9567}" type="datetimeFigureOut">
               <a:rPr lang="en-US" dirty="0"/>
               <a:pPr/>
-              <a:t>6/15/2015</a:t>
+              <a:t>6/16/2015</a:t>
             </a:fld>
             <a:endParaRPr lang="en-US" dirty="0"/>
           </a:p>
@@ -2800,7 +2804,7 @@
             <a:fld id="{B61BEF0D-F0BB-DE4B-95CE-6DB70DBA9567}" type="datetimeFigureOut">
               <a:rPr lang="en-US" dirty="0"/>
               <a:pPr/>
-              <a:t>6/15/2015</a:t>
+              <a:t>6/16/2015</a:t>
             </a:fld>
             <a:endParaRPr lang="en-US" dirty="0"/>
           </a:p>
@@ -3047,7 +3051,7 @@
             <a:fld id="{B61BEF0D-F0BB-DE4B-95CE-6DB70DBA9567}" type="datetimeFigureOut">
               <a:rPr lang="en-US" dirty="0"/>
               <a:pPr/>
-              <a:t>6/15/2015</a:t>
+              <a:t>6/16/2015</a:t>
             </a:fld>
             <a:endParaRPr lang="en-US" dirty="0"/>
           </a:p>
@@ -3280,7 +3284,7 @@
             <a:fld id="{B61BEF0D-F0BB-DE4B-95CE-6DB70DBA9567}" type="datetimeFigureOut">
               <a:rPr lang="en-US" dirty="0"/>
               <a:pPr/>
-              <a:t>6/15/2015</a:t>
+              <a:t>6/16/2015</a:t>
             </a:fld>
             <a:endParaRPr lang="en-US" dirty="0"/>
           </a:p>
@@ -3659,7 +3663,7 @@
             <a:fld id="{B61BEF0D-F0BB-DE4B-95CE-6DB70DBA9567}" type="datetimeFigureOut">
               <a:rPr lang="en-US" dirty="0"/>
               <a:pPr/>
-              <a:t>6/15/2015</a:t>
+              <a:t>6/16/2015</a:t>
             </a:fld>
             <a:endParaRPr lang="en-US" dirty="0"/>
           </a:p>
@@ -3774,7 +3778,7 @@
             <a:fld id="{B61BEF0D-F0BB-DE4B-95CE-6DB70DBA9567}" type="datetimeFigureOut">
               <a:rPr lang="en-US" dirty="0"/>
               <a:pPr/>
-              <a:t>6/15/2015</a:t>
+              <a:t>6/16/2015</a:t>
             </a:fld>
             <a:endParaRPr lang="en-US" dirty="0"/>
           </a:p>
@@ -3866,7 +3870,7 @@
             <a:fld id="{B61BEF0D-F0BB-DE4B-95CE-6DB70DBA9567}" type="datetimeFigureOut">
               <a:rPr lang="en-US" dirty="0"/>
               <a:pPr/>
-              <a:t>6/15/2015</a:t>
+              <a:t>6/16/2015</a:t>
             </a:fld>
             <a:endParaRPr lang="en-US" dirty="0"/>
           </a:p>
@@ -4118,7 +4122,7 @@
             <a:fld id="{B61BEF0D-F0BB-DE4B-95CE-6DB70DBA9567}" type="datetimeFigureOut">
               <a:rPr lang="en-US" dirty="0"/>
               <a:pPr/>
-              <a:t>6/15/2015</a:t>
+              <a:t>6/16/2015</a:t>
             </a:fld>
             <a:endParaRPr lang="en-US" dirty="0"/>
           </a:p>
@@ -4398,7 +4402,7 @@
             <a:fld id="{B61BEF0D-F0BB-DE4B-95CE-6DB70DBA9567}" type="datetimeFigureOut">
               <a:rPr lang="en-US" dirty="0"/>
               <a:pPr/>
-              <a:t>6/15/2015</a:t>
+              <a:t>6/16/2015</a:t>
             </a:fld>
             <a:endParaRPr lang="en-US" dirty="0"/>
           </a:p>
@@ -4801,7 +4805,7 @@
             <a:fld id="{B61BEF0D-F0BB-DE4B-95CE-6DB70DBA9567}" type="datetimeFigureOut">
               <a:rPr lang="en-US" dirty="0"/>
               <a:pPr/>
-              <a:t>6/15/2015</a:t>
+              <a:t>6/16/2015</a:t>
             </a:fld>
             <a:endParaRPr lang="en-US" dirty="0"/>
           </a:p>
@@ -8472,15 +8476,7 @@
                   <a:schemeClr val="bg1"/>
                 </a:solidFill>
               </a:rPr>
-              <a:t>Proceso de </a:t>
-            </a:r>
-            <a:r>
-              <a:rPr lang="es-MX" sz="2800" dirty="0" smtClean="0">
-                <a:solidFill>
-                  <a:schemeClr val="bg1"/>
-                </a:solidFill>
-              </a:rPr>
-              <a:t>Cambios</a:t>
+              <a:t>Proceso de Cambios</a:t>
             </a:r>
           </a:p>
           <a:p>
@@ -8525,11 +8521,6 @@
               </a:rPr>
               <a:t> GIT</a:t>
             </a:r>
-            <a:endParaRPr lang="es-MX" sz="2800" dirty="0" smtClean="0">
-              <a:solidFill>
-                <a:schemeClr val="bg1"/>
-              </a:solidFill>
-            </a:endParaRPr>
           </a:p>
         </p:txBody>
       </p:sp>
@@ -8550,6 +8541,581 @@
       </p:par>
     </p:tnLst>
   </p:timing>
+</p:sld>
+</file>
+
+<file path=ppt/slides/slide20.xml><?xml version="1.0" encoding="utf-8"?>
+<p:sld xmlns:a="http://schemas.openxmlformats.org/drawingml/2006/main" xmlns:r="http://schemas.openxmlformats.org/officeDocument/2006/relationships" xmlns:p="http://schemas.openxmlformats.org/presentationml/2006/main">
+  <p:cSld>
+    <p:spTree>
+      <p:nvGrpSpPr>
+        <p:cNvPr id="1" name=""/>
+        <p:cNvGrpSpPr/>
+        <p:nvPr/>
+      </p:nvGrpSpPr>
+      <p:grpSpPr>
+        <a:xfrm>
+          <a:off x="0" y="0"/>
+          <a:ext cx="0" cy="0"/>
+          <a:chOff x="0" y="0"/>
+          <a:chExt cx="0" cy="0"/>
+        </a:xfrm>
+      </p:grpSpPr>
+      <p:sp>
+        <p:nvSpPr>
+          <p:cNvPr id="2" name="Título 1"/>
+          <p:cNvSpPr>
+            <a:spLocks noGrp="1"/>
+          </p:cNvSpPr>
+          <p:nvPr>
+            <p:ph type="title"/>
+          </p:nvPr>
+        </p:nvSpPr>
+        <p:spPr>
+          <a:xfrm>
+            <a:off x="1158240" y="685800"/>
+            <a:ext cx="9584372" cy="1371600"/>
+          </a:xfrm>
+        </p:spPr>
+        <p:txBody>
+          <a:bodyPr>
+            <a:noAutofit/>
+          </a:bodyPr>
+          <a:lstStyle/>
+          <a:p>
+            <a:pPr algn="ctr"/>
+            <a:r>
+              <a:rPr lang="es-MX" sz="4400" dirty="0" smtClean="0"/>
+              <a:t>Instrucciones básicas de uso</a:t>
+            </a:r>
+            <a:endParaRPr lang="es-MX" sz="4400" dirty="0"/>
+          </a:p>
+        </p:txBody>
+      </p:sp>
+      <p:pic>
+        <p:nvPicPr>
+          <p:cNvPr id="5" name="Imagen 4"/>
+          <p:cNvPicPr>
+            <a:picLocks noChangeAspect="1"/>
+          </p:cNvPicPr>
+          <p:nvPr/>
+        </p:nvPicPr>
+        <p:blipFill rotWithShape="1">
+          <a:blip r:embed="rId2"/>
+          <a:srcRect r="1875" b="85625"/>
+          <a:stretch/>
+        </p:blipFill>
+        <p:spPr>
+          <a:xfrm>
+            <a:off x="74612" y="2392680"/>
+            <a:ext cx="12067430" cy="1325880"/>
+          </a:xfrm>
+          <a:prstGeom prst="rect">
+            <a:avLst/>
+          </a:prstGeom>
+        </p:spPr>
+      </p:pic>
+    </p:spTree>
+    <p:extLst>
+      <p:ext uri="{BB962C8B-B14F-4D97-AF65-F5344CB8AC3E}">
+        <p14:creationId xmlns:p14="http://schemas.microsoft.com/office/powerpoint/2010/main" val="2578781930"/>
+      </p:ext>
+    </p:extLst>
+  </p:cSld>
+  <p:clrMapOvr>
+    <a:masterClrMapping/>
+  </p:clrMapOvr>
+</p:sld>
+</file>
+
+<file path=ppt/slides/slide21.xml><?xml version="1.0" encoding="utf-8"?>
+<p:sld xmlns:a="http://schemas.openxmlformats.org/drawingml/2006/main" xmlns:r="http://schemas.openxmlformats.org/officeDocument/2006/relationships" xmlns:p="http://schemas.openxmlformats.org/presentationml/2006/main">
+  <p:cSld>
+    <p:spTree>
+      <p:nvGrpSpPr>
+        <p:cNvPr id="1" name=""/>
+        <p:cNvGrpSpPr/>
+        <p:nvPr/>
+      </p:nvGrpSpPr>
+      <p:grpSpPr>
+        <a:xfrm>
+          <a:off x="0" y="0"/>
+          <a:ext cx="0" cy="0"/>
+          <a:chOff x="0" y="0"/>
+          <a:chExt cx="0" cy="0"/>
+        </a:xfrm>
+      </p:grpSpPr>
+      <p:sp>
+        <p:nvSpPr>
+          <p:cNvPr id="5" name="Título 4"/>
+          <p:cNvSpPr>
+            <a:spLocks noGrp="1"/>
+          </p:cNvSpPr>
+          <p:nvPr>
+            <p:ph type="title"/>
+          </p:nvPr>
+        </p:nvSpPr>
+        <p:spPr>
+          <a:xfrm>
+            <a:off x="684213" y="685800"/>
+            <a:ext cx="10058400" cy="899160"/>
+          </a:xfrm>
+        </p:spPr>
+        <p:txBody>
+          <a:bodyPr/>
+          <a:lstStyle/>
+          <a:p>
+            <a:pPr algn="ctr"/>
+            <a:r>
+              <a:rPr lang="es-MX" dirty="0" smtClean="0"/>
+              <a:t>Clone</a:t>
+            </a:r>
+            <a:endParaRPr lang="es-MX" dirty="0"/>
+          </a:p>
+        </p:txBody>
+      </p:sp>
+      <p:sp>
+        <p:nvSpPr>
+          <p:cNvPr id="9" name="Marcador de texto 8"/>
+          <p:cNvSpPr>
+            <a:spLocks noGrp="1"/>
+          </p:cNvSpPr>
+          <p:nvPr>
+            <p:ph type="body" idx="1"/>
+          </p:nvPr>
+        </p:nvSpPr>
+        <p:spPr>
+          <a:xfrm>
+            <a:off x="44132" y="1662430"/>
+            <a:ext cx="4375468" cy="1879600"/>
+          </a:xfrm>
+        </p:spPr>
+        <p:txBody>
+          <a:bodyPr/>
+          <a:lstStyle/>
+          <a:p>
+            <a:r>
+              <a:rPr lang="es-MX" dirty="0" smtClean="0">
+                <a:solidFill>
+                  <a:schemeClr val="tx1"/>
+                </a:solidFill>
+              </a:rPr>
+              <a:t>Tras presionar el botón clone muestra esta ventana en la cual se permite agregar la </a:t>
+            </a:r>
+            <a:r>
+              <a:rPr lang="es-MX" dirty="0" err="1" smtClean="0">
+                <a:solidFill>
+                  <a:schemeClr val="tx1"/>
+                </a:solidFill>
+              </a:rPr>
+              <a:t>url</a:t>
+            </a:r>
+            <a:r>
+              <a:rPr lang="es-MX" dirty="0" smtClean="0">
+                <a:solidFill>
+                  <a:schemeClr val="tx1"/>
+                </a:solidFill>
+              </a:rPr>
+              <a:t> del repositorio y la dirección de almacenaje.</a:t>
+            </a:r>
+            <a:endParaRPr lang="es-MX" dirty="0">
+              <a:solidFill>
+                <a:schemeClr val="tx1"/>
+              </a:solidFill>
+            </a:endParaRPr>
+          </a:p>
+        </p:txBody>
+      </p:sp>
+      <p:pic>
+        <p:nvPicPr>
+          <p:cNvPr id="8" name="Imagen 7"/>
+          <p:cNvPicPr>
+            <a:picLocks noChangeAspect="1"/>
+          </p:cNvPicPr>
+          <p:nvPr/>
+        </p:nvPicPr>
+        <p:blipFill rotWithShape="1">
+          <a:blip r:embed="rId2"/>
+          <a:srcRect l="28437" t="22500" r="4376" b="35000"/>
+          <a:stretch/>
+        </p:blipFill>
+        <p:spPr>
+          <a:xfrm>
+            <a:off x="4526280" y="2788920"/>
+            <a:ext cx="7543800" cy="3939540"/>
+          </a:xfrm>
+          <a:prstGeom prst="rect">
+            <a:avLst/>
+          </a:prstGeom>
+        </p:spPr>
+      </p:pic>
+    </p:spTree>
+    <p:extLst>
+      <p:ext uri="{BB962C8B-B14F-4D97-AF65-F5344CB8AC3E}">
+        <p14:creationId xmlns:p14="http://schemas.microsoft.com/office/powerpoint/2010/main" val="217448299"/>
+      </p:ext>
+    </p:extLst>
+  </p:cSld>
+  <p:clrMapOvr>
+    <a:masterClrMapping/>
+  </p:clrMapOvr>
+</p:sld>
+</file>
+
+<file path=ppt/slides/slide22.xml><?xml version="1.0" encoding="utf-8"?>
+<p:sld xmlns:a="http://schemas.openxmlformats.org/drawingml/2006/main" xmlns:r="http://schemas.openxmlformats.org/officeDocument/2006/relationships" xmlns:p="http://schemas.openxmlformats.org/presentationml/2006/main">
+  <p:cSld>
+    <p:spTree>
+      <p:nvGrpSpPr>
+        <p:cNvPr id="1" name=""/>
+        <p:cNvGrpSpPr/>
+        <p:nvPr/>
+      </p:nvGrpSpPr>
+      <p:grpSpPr>
+        <a:xfrm>
+          <a:off x="0" y="0"/>
+          <a:ext cx="0" cy="0"/>
+          <a:chOff x="0" y="0"/>
+          <a:chExt cx="0" cy="0"/>
+        </a:xfrm>
+      </p:grpSpPr>
+      <p:sp>
+        <p:nvSpPr>
+          <p:cNvPr id="2" name="Título 1"/>
+          <p:cNvSpPr>
+            <a:spLocks noGrp="1"/>
+          </p:cNvSpPr>
+          <p:nvPr>
+            <p:ph type="title"/>
+          </p:nvPr>
+        </p:nvSpPr>
+        <p:spPr>
+          <a:xfrm>
+            <a:off x="684212" y="304800"/>
+            <a:ext cx="10058400" cy="929640"/>
+          </a:xfrm>
+        </p:spPr>
+        <p:txBody>
+          <a:bodyPr/>
+          <a:lstStyle/>
+          <a:p>
+            <a:pPr algn="ctr"/>
+            <a:r>
+              <a:rPr lang="es-MX" dirty="0" err="1" smtClean="0"/>
+              <a:t>Commit</a:t>
+            </a:r>
+            <a:endParaRPr lang="es-MX" dirty="0"/>
+          </a:p>
+        </p:txBody>
+      </p:sp>
+      <p:sp>
+        <p:nvSpPr>
+          <p:cNvPr id="3" name="Marcador de texto 2"/>
+          <p:cNvSpPr>
+            <a:spLocks noGrp="1"/>
+          </p:cNvSpPr>
+          <p:nvPr>
+            <p:ph type="body" idx="1"/>
+          </p:nvPr>
+        </p:nvSpPr>
+        <p:spPr>
+          <a:xfrm>
+            <a:off x="684212" y="1082040"/>
+            <a:ext cx="3720148" cy="4912360"/>
+          </a:xfrm>
+        </p:spPr>
+        <p:txBody>
+          <a:bodyPr/>
+          <a:lstStyle/>
+          <a:p>
+            <a:r>
+              <a:rPr lang="es-MX" dirty="0" smtClean="0">
+                <a:solidFill>
+                  <a:schemeClr val="tx1"/>
+                </a:solidFill>
+              </a:rPr>
+              <a:t>Se muestran los archivos modificados en un costado , aquellos que se desean agregar al repositorio seleccionarlos y poner algo en la sección </a:t>
+            </a:r>
+            <a:r>
+              <a:rPr lang="es-MX" dirty="0" err="1" smtClean="0">
+                <a:solidFill>
+                  <a:schemeClr val="tx1"/>
+                </a:solidFill>
+              </a:rPr>
+              <a:t>commit</a:t>
+            </a:r>
+            <a:r>
+              <a:rPr lang="es-MX" dirty="0" smtClean="0">
+                <a:solidFill>
+                  <a:schemeClr val="tx1"/>
+                </a:solidFill>
+              </a:rPr>
+              <a:t>, se puede seleccionar el campo </a:t>
+            </a:r>
+            <a:r>
+              <a:rPr lang="es-MX" dirty="0" err="1" smtClean="0">
+                <a:solidFill>
+                  <a:schemeClr val="tx1"/>
+                </a:solidFill>
+              </a:rPr>
+              <a:t>push</a:t>
+            </a:r>
+            <a:r>
+              <a:rPr lang="es-MX" dirty="0" smtClean="0">
+                <a:solidFill>
+                  <a:schemeClr val="tx1"/>
+                </a:solidFill>
+              </a:rPr>
+              <a:t> para ingresarlo al repositorio o no marcarlo. </a:t>
+            </a:r>
+            <a:endParaRPr lang="es-MX" dirty="0">
+              <a:solidFill>
+                <a:schemeClr val="tx1"/>
+              </a:solidFill>
+            </a:endParaRPr>
+          </a:p>
+        </p:txBody>
+      </p:sp>
+      <p:pic>
+        <p:nvPicPr>
+          <p:cNvPr id="4" name="Imagen 3"/>
+          <p:cNvPicPr>
+            <a:picLocks noChangeAspect="1"/>
+          </p:cNvPicPr>
+          <p:nvPr/>
+        </p:nvPicPr>
+        <p:blipFill rotWithShape="1">
+          <a:blip r:embed="rId2"/>
+          <a:srcRect l="25313" t="13958" r="625" b="8750"/>
+          <a:stretch/>
+        </p:blipFill>
+        <p:spPr>
+          <a:xfrm>
+            <a:off x="4952206" y="1203960"/>
+            <a:ext cx="7223760" cy="5654040"/>
+          </a:xfrm>
+          <a:prstGeom prst="rect">
+            <a:avLst/>
+          </a:prstGeom>
+        </p:spPr>
+      </p:pic>
+    </p:spTree>
+    <p:extLst>
+      <p:ext uri="{BB962C8B-B14F-4D97-AF65-F5344CB8AC3E}">
+        <p14:creationId xmlns:p14="http://schemas.microsoft.com/office/powerpoint/2010/main" val="117010604"/>
+      </p:ext>
+    </p:extLst>
+  </p:cSld>
+  <p:clrMapOvr>
+    <a:masterClrMapping/>
+  </p:clrMapOvr>
+</p:sld>
+</file>
+
+<file path=ppt/slides/slide23.xml><?xml version="1.0" encoding="utf-8"?>
+<p:sld xmlns:a="http://schemas.openxmlformats.org/drawingml/2006/main" xmlns:r="http://schemas.openxmlformats.org/officeDocument/2006/relationships" xmlns:p="http://schemas.openxmlformats.org/presentationml/2006/main">
+  <p:cSld>
+    <p:spTree>
+      <p:nvGrpSpPr>
+        <p:cNvPr id="1" name=""/>
+        <p:cNvGrpSpPr/>
+        <p:nvPr/>
+      </p:nvGrpSpPr>
+      <p:grpSpPr>
+        <a:xfrm>
+          <a:off x="0" y="0"/>
+          <a:ext cx="0" cy="0"/>
+          <a:chOff x="0" y="0"/>
+          <a:chExt cx="0" cy="0"/>
+        </a:xfrm>
+      </p:grpSpPr>
+      <p:sp>
+        <p:nvSpPr>
+          <p:cNvPr id="2" name="Título 1"/>
+          <p:cNvSpPr>
+            <a:spLocks noGrp="1"/>
+          </p:cNvSpPr>
+          <p:nvPr>
+            <p:ph type="title"/>
+          </p:nvPr>
+        </p:nvSpPr>
+        <p:spPr>
+          <a:xfrm>
+            <a:off x="684213" y="685800"/>
+            <a:ext cx="10058400" cy="670560"/>
+          </a:xfrm>
+        </p:spPr>
+        <p:txBody>
+          <a:bodyPr/>
+          <a:lstStyle/>
+          <a:p>
+            <a:r>
+              <a:rPr lang="es-MX" dirty="0" err="1" smtClean="0"/>
+              <a:t>Pull</a:t>
+            </a:r>
+            <a:r>
+              <a:rPr lang="es-MX" dirty="0" smtClean="0"/>
+              <a:t> y </a:t>
+            </a:r>
+            <a:r>
+              <a:rPr lang="es-MX" dirty="0" err="1" smtClean="0"/>
+              <a:t>push</a:t>
+            </a:r>
+            <a:endParaRPr lang="es-MX" dirty="0"/>
+          </a:p>
+        </p:txBody>
+      </p:sp>
+      <p:sp>
+        <p:nvSpPr>
+          <p:cNvPr id="3" name="Marcador de texto 2"/>
+          <p:cNvSpPr>
+            <a:spLocks noGrp="1"/>
+          </p:cNvSpPr>
+          <p:nvPr>
+            <p:ph type="body" idx="1"/>
+          </p:nvPr>
+        </p:nvSpPr>
+        <p:spPr>
+          <a:xfrm>
+            <a:off x="684212" y="1356360"/>
+            <a:ext cx="3186748" cy="4638040"/>
+          </a:xfrm>
+        </p:spPr>
+        <p:txBody>
+          <a:bodyPr>
+            <a:normAutofit/>
+          </a:bodyPr>
+          <a:lstStyle/>
+          <a:p>
+            <a:r>
+              <a:rPr lang="es-MX" dirty="0" smtClean="0">
+                <a:solidFill>
+                  <a:schemeClr val="tx1"/>
+                </a:solidFill>
+              </a:rPr>
+              <a:t>Para generar </a:t>
+            </a:r>
+            <a:r>
+              <a:rPr lang="es-MX" dirty="0" err="1" smtClean="0">
+                <a:solidFill>
+                  <a:schemeClr val="tx1"/>
+                </a:solidFill>
+              </a:rPr>
+              <a:t>pull</a:t>
+            </a:r>
+            <a:r>
+              <a:rPr lang="es-MX" dirty="0" smtClean="0">
+                <a:solidFill>
+                  <a:schemeClr val="tx1"/>
+                </a:solidFill>
+              </a:rPr>
+              <a:t> basta con solo marcar la flecha de </a:t>
+            </a:r>
+            <a:r>
+              <a:rPr lang="es-MX" dirty="0" err="1" smtClean="0">
+                <a:solidFill>
+                  <a:schemeClr val="tx1"/>
+                </a:solidFill>
+              </a:rPr>
+              <a:t>pull</a:t>
+            </a:r>
+            <a:r>
+              <a:rPr lang="es-MX" dirty="0" smtClean="0">
+                <a:solidFill>
+                  <a:schemeClr val="tx1"/>
+                </a:solidFill>
+              </a:rPr>
+              <a:t> y seleccionar la rama a la que se generara dicho </a:t>
+            </a:r>
+            <a:r>
+              <a:rPr lang="es-MX" dirty="0" err="1" smtClean="0">
+                <a:solidFill>
+                  <a:schemeClr val="tx1"/>
+                </a:solidFill>
+              </a:rPr>
+              <a:t>pull</a:t>
+            </a:r>
+            <a:r>
+              <a:rPr lang="es-MX" dirty="0" smtClean="0">
+                <a:solidFill>
+                  <a:schemeClr val="tx1"/>
+                </a:solidFill>
+              </a:rPr>
+              <a:t>, en caso de </a:t>
+            </a:r>
+            <a:r>
+              <a:rPr lang="es-MX" dirty="0" err="1" smtClean="0">
+                <a:solidFill>
+                  <a:schemeClr val="tx1"/>
+                </a:solidFill>
+              </a:rPr>
+              <a:t>push</a:t>
+            </a:r>
+            <a:r>
+              <a:rPr lang="es-MX" dirty="0" smtClean="0">
+                <a:solidFill>
+                  <a:schemeClr val="tx1"/>
+                </a:solidFill>
+              </a:rPr>
+              <a:t> presionar la fecha </a:t>
+            </a:r>
+            <a:r>
+              <a:rPr lang="es-MX" dirty="0" err="1" smtClean="0">
+                <a:solidFill>
+                  <a:schemeClr val="tx1"/>
+                </a:solidFill>
+              </a:rPr>
+              <a:t>push</a:t>
+            </a:r>
+            <a:r>
+              <a:rPr lang="es-MX" dirty="0" smtClean="0">
+                <a:solidFill>
+                  <a:schemeClr val="tx1"/>
+                </a:solidFill>
+              </a:rPr>
+              <a:t> y seleccionar el repositorio</a:t>
+            </a:r>
+            <a:endParaRPr lang="es-MX" dirty="0">
+              <a:solidFill>
+                <a:schemeClr val="tx1"/>
+              </a:solidFill>
+            </a:endParaRPr>
+          </a:p>
+        </p:txBody>
+      </p:sp>
+      <p:pic>
+        <p:nvPicPr>
+          <p:cNvPr id="4" name="Imagen 3"/>
+          <p:cNvPicPr>
+            <a:picLocks noChangeAspect="1"/>
+          </p:cNvPicPr>
+          <p:nvPr/>
+        </p:nvPicPr>
+        <p:blipFill rotWithShape="1">
+          <a:blip r:embed="rId2"/>
+          <a:srcRect l="52433" r="33936" b="85625"/>
+          <a:stretch/>
+        </p:blipFill>
+        <p:spPr>
+          <a:xfrm>
+            <a:off x="6614159" y="2118360"/>
+            <a:ext cx="2408621" cy="1905000"/>
+          </a:xfrm>
+          <a:prstGeom prst="rect">
+            <a:avLst/>
+          </a:prstGeom>
+        </p:spPr>
+      </p:pic>
+    </p:spTree>
+    <p:extLst>
+      <p:ext uri="{BB962C8B-B14F-4D97-AF65-F5344CB8AC3E}">
+        <p14:creationId xmlns:p14="http://schemas.microsoft.com/office/powerpoint/2010/main" val="1973970339"/>
+      </p:ext>
+    </p:extLst>
+  </p:cSld>
+  <p:clrMapOvr>
+    <a:masterClrMapping/>
+  </p:clrMapOvr>
 </p:sld>
 </file>
 

</xml_diff>

<commit_message>
Actualizando presentacion de capacitacion
</commit_message>
<xml_diff>
--- a/adicionales/presentacion procesos/Capacitación de los procesos via.pptx
+++ b/adicionales/presentacion procesos/Capacitación de los procesos via.pptx
@@ -326,7 +326,7 @@
             <a:fld id="{B61BEF0D-F0BB-DE4B-95CE-6DB70DBA9567}" type="datetimeFigureOut">
               <a:rPr lang="en-US" dirty="0"/>
               <a:pPr/>
-              <a:t>6/16/2015</a:t>
+              <a:t>6/17/2015</a:t>
             </a:fld>
             <a:endParaRPr lang="en-US" dirty="0"/>
           </a:p>
@@ -759,7 +759,7 @@
             <a:fld id="{B61BEF0D-F0BB-DE4B-95CE-6DB70DBA9567}" type="datetimeFigureOut">
               <a:rPr lang="en-US" dirty="0"/>
               <a:pPr/>
-              <a:t>6/16/2015</a:t>
+              <a:t>6/17/2015</a:t>
             </a:fld>
             <a:endParaRPr lang="en-US" dirty="0"/>
           </a:p>
@@ -1006,7 +1006,7 @@
             <a:fld id="{B61BEF0D-F0BB-DE4B-95CE-6DB70DBA9567}" type="datetimeFigureOut">
               <a:rPr lang="en-US" dirty="0"/>
               <a:pPr/>
-              <a:t>6/16/2015</a:t>
+              <a:t>6/17/2015</a:t>
             </a:fld>
             <a:endParaRPr lang="en-US" dirty="0"/>
           </a:p>
@@ -1311,7 +1311,7 @@
             <a:fld id="{B61BEF0D-F0BB-DE4B-95CE-6DB70DBA9567}" type="datetimeFigureOut">
               <a:rPr lang="en-US" dirty="0"/>
               <a:pPr/>
-              <a:t>6/16/2015</a:t>
+              <a:t>6/17/2015</a:t>
             </a:fld>
             <a:endParaRPr lang="en-US" dirty="0"/>
           </a:p>
@@ -1626,7 +1626,7 @@
             <a:fld id="{B61BEF0D-F0BB-DE4B-95CE-6DB70DBA9567}" type="datetimeFigureOut">
               <a:rPr lang="en-US" dirty="0"/>
               <a:pPr/>
-              <a:t>6/16/2015</a:t>
+              <a:t>6/17/2015</a:t>
             </a:fld>
             <a:endParaRPr lang="en-US" dirty="0"/>
           </a:p>
@@ -1925,7 +1925,7 @@
             <a:fld id="{B61BEF0D-F0BB-DE4B-95CE-6DB70DBA9567}" type="datetimeFigureOut">
               <a:rPr lang="en-US" dirty="0"/>
               <a:pPr/>
-              <a:t>6/16/2015</a:t>
+              <a:t>6/17/2015</a:t>
             </a:fld>
             <a:endParaRPr lang="en-US" dirty="0"/>
           </a:p>
@@ -2289,7 +2289,7 @@
             <a:fld id="{B61BEF0D-F0BB-DE4B-95CE-6DB70DBA9567}" type="datetimeFigureOut">
               <a:rPr lang="en-US" dirty="0"/>
               <a:pPr/>
-              <a:t>6/16/2015</a:t>
+              <a:t>6/17/2015</a:t>
             </a:fld>
             <a:endParaRPr lang="en-US" dirty="0"/>
           </a:p>
@@ -2460,7 +2460,7 @@
             <a:fld id="{B61BEF0D-F0BB-DE4B-95CE-6DB70DBA9567}" type="datetimeFigureOut">
               <a:rPr lang="en-US" dirty="0"/>
               <a:pPr/>
-              <a:t>6/16/2015</a:t>
+              <a:t>6/17/2015</a:t>
             </a:fld>
             <a:endParaRPr lang="en-US" dirty="0"/>
           </a:p>
@@ -2637,7 +2637,7 @@
             <a:fld id="{B61BEF0D-F0BB-DE4B-95CE-6DB70DBA9567}" type="datetimeFigureOut">
               <a:rPr lang="en-US" dirty="0"/>
               <a:pPr/>
-              <a:t>6/16/2015</a:t>
+              <a:t>6/17/2015</a:t>
             </a:fld>
             <a:endParaRPr lang="en-US" dirty="0"/>
           </a:p>
@@ -2804,7 +2804,7 @@
             <a:fld id="{B61BEF0D-F0BB-DE4B-95CE-6DB70DBA9567}" type="datetimeFigureOut">
               <a:rPr lang="en-US" dirty="0"/>
               <a:pPr/>
-              <a:t>6/16/2015</a:t>
+              <a:t>6/17/2015</a:t>
             </a:fld>
             <a:endParaRPr lang="en-US" dirty="0"/>
           </a:p>
@@ -3051,7 +3051,7 @@
             <a:fld id="{B61BEF0D-F0BB-DE4B-95CE-6DB70DBA9567}" type="datetimeFigureOut">
               <a:rPr lang="en-US" dirty="0"/>
               <a:pPr/>
-              <a:t>6/16/2015</a:t>
+              <a:t>6/17/2015</a:t>
             </a:fld>
             <a:endParaRPr lang="en-US" dirty="0"/>
           </a:p>
@@ -3284,7 +3284,7 @@
             <a:fld id="{B61BEF0D-F0BB-DE4B-95CE-6DB70DBA9567}" type="datetimeFigureOut">
               <a:rPr lang="en-US" dirty="0"/>
               <a:pPr/>
-              <a:t>6/16/2015</a:t>
+              <a:t>6/17/2015</a:t>
             </a:fld>
             <a:endParaRPr lang="en-US" dirty="0"/>
           </a:p>
@@ -3663,7 +3663,7 @@
             <a:fld id="{B61BEF0D-F0BB-DE4B-95CE-6DB70DBA9567}" type="datetimeFigureOut">
               <a:rPr lang="en-US" dirty="0"/>
               <a:pPr/>
-              <a:t>6/16/2015</a:t>
+              <a:t>6/17/2015</a:t>
             </a:fld>
             <a:endParaRPr lang="en-US" dirty="0"/>
           </a:p>
@@ -3778,7 +3778,7 @@
             <a:fld id="{B61BEF0D-F0BB-DE4B-95CE-6DB70DBA9567}" type="datetimeFigureOut">
               <a:rPr lang="en-US" dirty="0"/>
               <a:pPr/>
-              <a:t>6/16/2015</a:t>
+              <a:t>6/17/2015</a:t>
             </a:fld>
             <a:endParaRPr lang="en-US" dirty="0"/>
           </a:p>
@@ -3870,7 +3870,7 @@
             <a:fld id="{B61BEF0D-F0BB-DE4B-95CE-6DB70DBA9567}" type="datetimeFigureOut">
               <a:rPr lang="en-US" dirty="0"/>
               <a:pPr/>
-              <a:t>6/16/2015</a:t>
+              <a:t>6/17/2015</a:t>
             </a:fld>
             <a:endParaRPr lang="en-US" dirty="0"/>
           </a:p>
@@ -4122,7 +4122,7 @@
             <a:fld id="{B61BEF0D-F0BB-DE4B-95CE-6DB70DBA9567}" type="datetimeFigureOut">
               <a:rPr lang="en-US" dirty="0"/>
               <a:pPr/>
-              <a:t>6/16/2015</a:t>
+              <a:t>6/17/2015</a:t>
             </a:fld>
             <a:endParaRPr lang="en-US" dirty="0"/>
           </a:p>
@@ -4402,7 +4402,7 @@
             <a:fld id="{B61BEF0D-F0BB-DE4B-95CE-6DB70DBA9567}" type="datetimeFigureOut">
               <a:rPr lang="en-US" dirty="0"/>
               <a:pPr/>
-              <a:t>6/16/2015</a:t>
+              <a:t>6/17/2015</a:t>
             </a:fld>
             <a:endParaRPr lang="en-US" dirty="0"/>
           </a:p>
@@ -4805,7 +4805,7 @@
             <a:fld id="{B61BEF0D-F0BB-DE4B-95CE-6DB70DBA9567}" type="datetimeFigureOut">
               <a:rPr lang="en-US" dirty="0"/>
               <a:pPr/>
-              <a:t>6/16/2015</a:t>
+              <a:t>6/17/2015</a:t>
             </a:fld>
             <a:endParaRPr lang="en-US" dirty="0"/>
           </a:p>
@@ -11129,7 +11129,7 @@
       </p:grpSpPr>
       <p:pic>
         <p:nvPicPr>
-          <p:cNvPr id="3" name="Marcador de contenido 2"/>
+          <p:cNvPr id="4" name="Marcador de contenido 3"/>
           <p:cNvPicPr>
             <a:picLocks noGrp="1" noChangeAspect="1"/>
           </p:cNvPicPr>
@@ -11145,13 +11145,13 @@
               </a:ext>
             </a:extLst>
           </a:blip>
-          <a:srcRect l="3093" r="17275" b="27190"/>
+          <a:srcRect l="1652" t="4835" r="12413" b="30186"/>
           <a:stretch/>
         </p:blipFill>
         <p:spPr>
           <a:xfrm>
-            <a:off x="1" y="755345"/>
-            <a:ext cx="12194142" cy="4548175"/>
+            <a:off x="0" y="1157465"/>
+            <a:ext cx="12125227" cy="3871735"/>
           </a:xfrm>
         </p:spPr>
       </p:pic>

</xml_diff>